<commit_message>
Site updated: 2019-01-09 20:26:50
</commit_message>
<xml_diff>
--- a/Presentation1.pptx
+++ b/Presentation1.pptx
@@ -6,6 +6,7 @@
   </p:sldMasterIdLst>
   <p:sldIdLst>
     <p:sldId id="256" r:id="rId3"/>
+    <p:sldId id="257" r:id="rId4"/>
   </p:sldIdLst>
   <p:sldSz cx="12192000" cy="6858000"/>
   <p:notesSz cx="6858000" cy="9144000"/>
@@ -4247,6 +4248,1419 @@
 </p:sld>
 </file>
 
+<file path=ppt/slides/slide2.xml><?xml version="1.0" encoding="utf-8"?>
+<p:sld xmlns:a="http://schemas.openxmlformats.org/drawingml/2006/main" xmlns:r="http://schemas.openxmlformats.org/officeDocument/2006/relationships" xmlns:p="http://schemas.openxmlformats.org/presentationml/2006/main">
+  <p:cSld>
+    <p:spTree>
+      <p:nvGrpSpPr>
+        <p:cNvPr id="1" name=""/>
+        <p:cNvGrpSpPr/>
+        <p:nvPr/>
+      </p:nvGrpSpPr>
+      <p:grpSpPr/>
+      <p:sp>
+        <p:nvSpPr>
+          <p:cNvPr id="4" name="Rounded Rectangle 3"/>
+          <p:cNvSpPr/>
+          <p:nvPr/>
+        </p:nvSpPr>
+        <p:spPr>
+          <a:xfrm>
+            <a:off x="1191895" y="883285"/>
+            <a:ext cx="8602980" cy="4461510"/>
+          </a:xfrm>
+          <a:prstGeom prst="roundRect">
+            <a:avLst/>
+          </a:prstGeom>
+          <a:ln w="254000"/>
+        </p:spPr>
+        <p:style>
+          <a:lnRef idx="2">
+            <a:schemeClr val="accent6"/>
+          </a:lnRef>
+          <a:fillRef idx="1">
+            <a:schemeClr val="lt1"/>
+          </a:fillRef>
+          <a:effectRef idx="0">
+            <a:schemeClr val="accent6"/>
+          </a:effectRef>
+          <a:fontRef idx="minor">
+            <a:schemeClr val="dk1"/>
+          </a:fontRef>
+        </p:style>
+        <p:txBody>
+          <a:bodyPr rtlCol="0" anchor="ctr"/>
+          <a:p>
+            <a:pPr algn="ctr"/>
+            <a:endParaRPr lang="en-US"/>
+          </a:p>
+        </p:txBody>
+      </p:sp>
+      <p:cxnSp>
+        <p:nvCxnSpPr>
+          <p:cNvPr id="15" name="Straight Connector 14"/>
+          <p:cNvCxnSpPr/>
+          <p:nvPr/>
+        </p:nvCxnSpPr>
+        <p:spPr>
+          <a:xfrm>
+            <a:off x="690880" y="1415415"/>
+            <a:ext cx="2598420" cy="0"/>
+          </a:xfrm>
+          <a:prstGeom prst="line">
+            <a:avLst/>
+          </a:prstGeom>
+          <a:ln w="101600"/>
+        </p:spPr>
+        <p:style>
+          <a:lnRef idx="1">
+            <a:schemeClr val="accent1"/>
+          </a:lnRef>
+          <a:fillRef idx="0">
+            <a:schemeClr val="accent1"/>
+          </a:fillRef>
+          <a:effectRef idx="0">
+            <a:schemeClr val="accent1"/>
+          </a:effectRef>
+          <a:fontRef idx="minor">
+            <a:schemeClr val="tx1"/>
+          </a:fontRef>
+        </p:style>
+      </p:cxnSp>
+      <p:cxnSp>
+        <p:nvCxnSpPr>
+          <p:cNvPr id="18" name="Straight Connector 17"/>
+          <p:cNvCxnSpPr/>
+          <p:nvPr/>
+        </p:nvCxnSpPr>
+        <p:spPr>
+          <a:xfrm>
+            <a:off x="1767205" y="1437005"/>
+            <a:ext cx="0" cy="3247390"/>
+          </a:xfrm>
+          <a:prstGeom prst="line">
+            <a:avLst/>
+          </a:prstGeom>
+          <a:ln w="101600"/>
+        </p:spPr>
+        <p:style>
+          <a:lnRef idx="1">
+            <a:schemeClr val="accent1"/>
+          </a:lnRef>
+          <a:fillRef idx="0">
+            <a:schemeClr val="accent1"/>
+          </a:fillRef>
+          <a:effectRef idx="0">
+            <a:schemeClr val="accent1"/>
+          </a:effectRef>
+          <a:fontRef idx="minor">
+            <a:schemeClr val="tx1"/>
+          </a:fontRef>
+        </p:style>
+      </p:cxnSp>
+      <p:cxnSp>
+        <p:nvCxnSpPr>
+          <p:cNvPr id="19" name="Straight Connector 18"/>
+          <p:cNvCxnSpPr/>
+          <p:nvPr/>
+        </p:nvCxnSpPr>
+        <p:spPr>
+          <a:xfrm>
+            <a:off x="382270" y="4705985"/>
+            <a:ext cx="2299970" cy="0"/>
+          </a:xfrm>
+          <a:prstGeom prst="line">
+            <a:avLst/>
+          </a:prstGeom>
+          <a:ln w="101600"/>
+        </p:spPr>
+        <p:style>
+          <a:lnRef idx="1">
+            <a:schemeClr val="accent1"/>
+          </a:lnRef>
+          <a:fillRef idx="0">
+            <a:schemeClr val="accent1"/>
+          </a:fillRef>
+          <a:effectRef idx="0">
+            <a:schemeClr val="accent1"/>
+          </a:effectRef>
+          <a:fontRef idx="minor">
+            <a:schemeClr val="tx1"/>
+          </a:fontRef>
+        </p:style>
+      </p:cxnSp>
+      <p:cxnSp>
+        <p:nvCxnSpPr>
+          <p:cNvPr id="20" name="Straight Connector 19"/>
+          <p:cNvCxnSpPr/>
+          <p:nvPr/>
+        </p:nvCxnSpPr>
+        <p:spPr>
+          <a:xfrm>
+            <a:off x="2672080" y="4332605"/>
+            <a:ext cx="2874645" cy="0"/>
+          </a:xfrm>
+          <a:prstGeom prst="line">
+            <a:avLst/>
+          </a:prstGeom>
+          <a:ln w="101600"/>
+        </p:spPr>
+        <p:style>
+          <a:lnRef idx="1">
+            <a:schemeClr val="accent1"/>
+          </a:lnRef>
+          <a:fillRef idx="0">
+            <a:schemeClr val="accent1"/>
+          </a:fillRef>
+          <a:effectRef idx="0">
+            <a:schemeClr val="accent1"/>
+          </a:effectRef>
+          <a:fontRef idx="minor">
+            <a:schemeClr val="tx1"/>
+          </a:fontRef>
+        </p:style>
+      </p:cxnSp>
+      <p:sp>
+        <p:nvSpPr>
+          <p:cNvPr id="21" name="Text Box 20"/>
+          <p:cNvSpPr txBox="1"/>
+          <p:nvPr/>
+        </p:nvSpPr>
+        <p:spPr>
+          <a:xfrm>
+            <a:off x="179705" y="1415415"/>
+            <a:ext cx="883920" cy="368300"/>
+          </a:xfrm>
+          <a:prstGeom prst="rect">
+            <a:avLst/>
+          </a:prstGeom>
+          <a:noFill/>
+        </p:spPr>
+        <p:txBody>
+          <a:bodyPr wrap="square" rtlCol="0">
+            <a:spAutoFit/>
+          </a:bodyPr>
+          <a:p>
+            <a:r>
+              <a:rPr lang="" altLang="en-US"/>
+              <a:t>h_t-1</a:t>
+            </a:r>
+            <a:endParaRPr lang="" altLang="en-US"/>
+          </a:p>
+        </p:txBody>
+      </p:sp>
+      <p:sp>
+        <p:nvSpPr>
+          <p:cNvPr id="22" name="Text Box 21"/>
+          <p:cNvSpPr txBox="1"/>
+          <p:nvPr/>
+        </p:nvSpPr>
+        <p:spPr>
+          <a:xfrm>
+            <a:off x="179705" y="4148455"/>
+            <a:ext cx="883920" cy="368300"/>
+          </a:xfrm>
+          <a:prstGeom prst="rect">
+            <a:avLst/>
+          </a:prstGeom>
+          <a:noFill/>
+        </p:spPr>
+        <p:txBody>
+          <a:bodyPr wrap="square" rtlCol="0">
+            <a:spAutoFit/>
+          </a:bodyPr>
+          <a:p>
+            <a:r>
+              <a:rPr lang="" altLang="en-US"/>
+              <a:t>x</a:t>
+            </a:r>
+            <a:r>
+              <a:rPr lang="en-US" altLang="en-US"/>
+              <a:t>_t</a:t>
+            </a:r>
+            <a:endParaRPr lang="en-US" altLang="en-US"/>
+          </a:p>
+        </p:txBody>
+      </p:sp>
+      <p:sp>
+        <p:nvSpPr>
+          <p:cNvPr id="23" name="Text Box 22"/>
+          <p:cNvSpPr txBox="1"/>
+          <p:nvPr/>
+        </p:nvSpPr>
+        <p:spPr>
+          <a:xfrm>
+            <a:off x="2947035" y="3854450"/>
+            <a:ext cx="1212850" cy="368300"/>
+          </a:xfrm>
+          <a:prstGeom prst="rect">
+            <a:avLst/>
+          </a:prstGeom>
+          <a:noFill/>
+        </p:spPr>
+        <p:txBody>
+          <a:bodyPr wrap="square" rtlCol="0">
+            <a:spAutoFit/>
+          </a:bodyPr>
+          <a:p>
+            <a:r>
+              <a:rPr lang="en-US" altLang="en-US"/>
+              <a:t>x</a:t>
+            </a:r>
+            <a:r>
+              <a:rPr lang="" altLang="en-US"/>
+              <a:t>_t_h_t-1</a:t>
+            </a:r>
+            <a:endParaRPr lang="" altLang="en-US"/>
+          </a:p>
+        </p:txBody>
+      </p:sp>
+      <p:sp>
+        <p:nvSpPr>
+          <p:cNvPr id="24" name="Oval 23"/>
+          <p:cNvSpPr/>
+          <p:nvPr/>
+        </p:nvSpPr>
+        <p:spPr>
+          <a:xfrm>
+            <a:off x="4310380" y="4041775"/>
+            <a:ext cx="916940" cy="581660"/>
+          </a:xfrm>
+          <a:prstGeom prst="ellipse">
+            <a:avLst/>
+          </a:prstGeom>
+        </p:spPr>
+        <p:style>
+          <a:lnRef idx="2">
+            <a:schemeClr val="accent1">
+              <a:shade val="50000"/>
+            </a:schemeClr>
+          </a:lnRef>
+          <a:fillRef idx="1">
+            <a:schemeClr val="accent1"/>
+          </a:fillRef>
+          <a:effectRef idx="0">
+            <a:schemeClr val="accent1"/>
+          </a:effectRef>
+          <a:fontRef idx="minor">
+            <a:schemeClr val="lt1"/>
+          </a:fontRef>
+        </p:style>
+        <p:txBody>
+          <a:bodyPr rtlCol="0" anchor="ctr"/>
+          <a:p>
+            <a:pPr algn="ctr"/>
+            <a:r>
+              <a:rPr lang="" altLang="en-US"/>
+              <a:t>w/b</a:t>
+            </a:r>
+            <a:endParaRPr lang="" altLang="en-US"/>
+          </a:p>
+        </p:txBody>
+      </p:sp>
+      <p:cxnSp>
+        <p:nvCxnSpPr>
+          <p:cNvPr id="25" name="Straight Connector 24"/>
+          <p:cNvCxnSpPr/>
+          <p:nvPr/>
+        </p:nvCxnSpPr>
+        <p:spPr>
+          <a:xfrm>
+            <a:off x="5493385" y="3310890"/>
+            <a:ext cx="0" cy="1021715"/>
+          </a:xfrm>
+          <a:prstGeom prst="line">
+            <a:avLst/>
+          </a:prstGeom>
+          <a:ln w="101600"/>
+        </p:spPr>
+        <p:style>
+          <a:lnRef idx="1">
+            <a:schemeClr val="accent1"/>
+          </a:lnRef>
+          <a:fillRef idx="0">
+            <a:schemeClr val="accent1"/>
+          </a:fillRef>
+          <a:effectRef idx="0">
+            <a:schemeClr val="accent1"/>
+          </a:effectRef>
+          <a:fontRef idx="minor">
+            <a:schemeClr val="tx1"/>
+          </a:fontRef>
+        </p:style>
+      </p:cxnSp>
+      <p:sp>
+        <p:nvSpPr>
+          <p:cNvPr id="26" name="Oval 25"/>
+          <p:cNvSpPr/>
+          <p:nvPr/>
+        </p:nvSpPr>
+        <p:spPr>
+          <a:xfrm>
+            <a:off x="5034280" y="3641090"/>
+            <a:ext cx="874395" cy="581660"/>
+          </a:xfrm>
+          <a:prstGeom prst="ellipse">
+            <a:avLst/>
+          </a:prstGeom>
+          <a:solidFill>
+            <a:schemeClr val="accent2">
+              <a:lumMod val="60000"/>
+              <a:lumOff val="40000"/>
+            </a:schemeClr>
+          </a:solidFill>
+        </p:spPr>
+        <p:style>
+          <a:lnRef idx="2">
+            <a:schemeClr val="accent1">
+              <a:shade val="50000"/>
+            </a:schemeClr>
+          </a:lnRef>
+          <a:fillRef idx="1">
+            <a:schemeClr val="accent1"/>
+          </a:fillRef>
+          <a:effectRef idx="0">
+            <a:schemeClr val="accent1"/>
+          </a:effectRef>
+          <a:fontRef idx="minor">
+            <a:schemeClr val="lt1"/>
+          </a:fontRef>
+        </p:style>
+        <p:txBody>
+          <a:bodyPr rtlCol="0" anchor="ctr"/>
+          <a:p>
+            <a:pPr algn="ctr"/>
+            <a:r>
+              <a:rPr lang="" altLang="en-US"/>
+              <a:t>sig</a:t>
+            </a:r>
+            <a:endParaRPr lang="" altLang="en-US"/>
+          </a:p>
+        </p:txBody>
+      </p:sp>
+      <p:cxnSp>
+        <p:nvCxnSpPr>
+          <p:cNvPr id="27" name="Straight Connector 26"/>
+          <p:cNvCxnSpPr/>
+          <p:nvPr/>
+        </p:nvCxnSpPr>
+        <p:spPr>
+          <a:xfrm>
+            <a:off x="3735705" y="3289935"/>
+            <a:ext cx="1927225" cy="0"/>
+          </a:xfrm>
+          <a:prstGeom prst="line">
+            <a:avLst/>
+          </a:prstGeom>
+          <a:ln w="101600"/>
+        </p:spPr>
+        <p:style>
+          <a:lnRef idx="1">
+            <a:schemeClr val="accent1"/>
+          </a:lnRef>
+          <a:fillRef idx="0">
+            <a:schemeClr val="accent1"/>
+          </a:fillRef>
+          <a:effectRef idx="0">
+            <a:schemeClr val="accent1"/>
+          </a:effectRef>
+          <a:fontRef idx="minor">
+            <a:schemeClr val="tx1"/>
+          </a:fontRef>
+        </p:style>
+      </p:cxnSp>
+      <p:cxnSp>
+        <p:nvCxnSpPr>
+          <p:cNvPr id="28" name="Straight Connector 27"/>
+          <p:cNvCxnSpPr/>
+          <p:nvPr/>
+        </p:nvCxnSpPr>
+        <p:spPr>
+          <a:xfrm>
+            <a:off x="3735705" y="1416050"/>
+            <a:ext cx="0" cy="1894840"/>
+          </a:xfrm>
+          <a:prstGeom prst="line">
+            <a:avLst/>
+          </a:prstGeom>
+          <a:ln w="101600"/>
+        </p:spPr>
+        <p:style>
+          <a:lnRef idx="1">
+            <a:schemeClr val="accent1"/>
+          </a:lnRef>
+          <a:fillRef idx="0">
+            <a:schemeClr val="accent1"/>
+          </a:fillRef>
+          <a:effectRef idx="0">
+            <a:schemeClr val="accent1"/>
+          </a:effectRef>
+          <a:fontRef idx="minor">
+            <a:schemeClr val="tx1"/>
+          </a:fontRef>
+        </p:style>
+      </p:cxnSp>
+      <p:cxnSp>
+        <p:nvCxnSpPr>
+          <p:cNvPr id="29" name="Straight Connector 28"/>
+          <p:cNvCxnSpPr/>
+          <p:nvPr/>
+        </p:nvCxnSpPr>
+        <p:spPr>
+          <a:xfrm>
+            <a:off x="5662930" y="1979930"/>
+            <a:ext cx="0" cy="1320800"/>
+          </a:xfrm>
+          <a:prstGeom prst="line">
+            <a:avLst/>
+          </a:prstGeom>
+          <a:ln w="101600"/>
+        </p:spPr>
+        <p:style>
+          <a:lnRef idx="1">
+            <a:schemeClr val="accent1"/>
+          </a:lnRef>
+          <a:fillRef idx="0">
+            <a:schemeClr val="accent1"/>
+          </a:fillRef>
+          <a:effectRef idx="0">
+            <a:schemeClr val="accent1"/>
+          </a:effectRef>
+          <a:fontRef idx="minor">
+            <a:schemeClr val="tx1"/>
+          </a:fontRef>
+        </p:style>
+      </p:cxnSp>
+      <p:sp>
+        <p:nvSpPr>
+          <p:cNvPr id="30" name="Oval 29"/>
+          <p:cNvSpPr/>
+          <p:nvPr/>
+        </p:nvSpPr>
+        <p:spPr>
+          <a:xfrm>
+            <a:off x="4159885" y="2999105"/>
+            <a:ext cx="1001395" cy="581660"/>
+          </a:xfrm>
+          <a:prstGeom prst="ellipse">
+            <a:avLst/>
+          </a:prstGeom>
+          <a:solidFill>
+            <a:schemeClr val="accent2">
+              <a:lumMod val="60000"/>
+              <a:lumOff val="40000"/>
+            </a:schemeClr>
+          </a:solidFill>
+        </p:spPr>
+        <p:style>
+          <a:lnRef idx="2">
+            <a:schemeClr val="accent1">
+              <a:shade val="50000"/>
+            </a:schemeClr>
+          </a:lnRef>
+          <a:fillRef idx="1">
+            <a:schemeClr val="accent1"/>
+          </a:fillRef>
+          <a:effectRef idx="0">
+            <a:schemeClr val="accent1"/>
+          </a:effectRef>
+          <a:fontRef idx="minor">
+            <a:schemeClr val="lt1"/>
+          </a:fontRef>
+        </p:style>
+        <p:txBody>
+          <a:bodyPr rtlCol="0" anchor="ctr"/>
+          <a:p>
+            <a:pPr algn="ctr"/>
+            <a:r>
+              <a:rPr lang="" altLang="en-US"/>
+              <a:t>split</a:t>
+            </a:r>
+            <a:endParaRPr lang="" altLang="en-US"/>
+          </a:p>
+        </p:txBody>
+      </p:sp>
+      <p:sp>
+        <p:nvSpPr>
+          <p:cNvPr id="32" name="Text Box 31"/>
+          <p:cNvSpPr txBox="1"/>
+          <p:nvPr/>
+        </p:nvSpPr>
+        <p:spPr>
+          <a:xfrm>
+            <a:off x="3745230" y="2673985"/>
+            <a:ext cx="414655" cy="368300"/>
+          </a:xfrm>
+          <a:prstGeom prst="rect">
+            <a:avLst/>
+          </a:prstGeom>
+          <a:noFill/>
+        </p:spPr>
+        <p:txBody>
+          <a:bodyPr wrap="square" rtlCol="0">
+            <a:spAutoFit/>
+          </a:bodyPr>
+          <a:p>
+            <a:r>
+              <a:rPr lang="" altLang="en-US"/>
+              <a:t>r</a:t>
+            </a:r>
+            <a:endParaRPr lang="" altLang="en-US"/>
+          </a:p>
+        </p:txBody>
+      </p:sp>
+      <p:sp>
+        <p:nvSpPr>
+          <p:cNvPr id="34" name="Text Box 33"/>
+          <p:cNvSpPr txBox="1"/>
+          <p:nvPr/>
+        </p:nvSpPr>
+        <p:spPr>
+          <a:xfrm>
+            <a:off x="5161280" y="2690495"/>
+            <a:ext cx="414655" cy="368300"/>
+          </a:xfrm>
+          <a:prstGeom prst="rect">
+            <a:avLst/>
+          </a:prstGeom>
+          <a:noFill/>
+        </p:spPr>
+        <p:txBody>
+          <a:bodyPr wrap="square" rtlCol="0">
+            <a:spAutoFit/>
+          </a:bodyPr>
+          <a:p>
+            <a:r>
+              <a:rPr lang="" altLang="en-US"/>
+              <a:t>u</a:t>
+            </a:r>
+            <a:endParaRPr lang="" altLang="en-US"/>
+          </a:p>
+        </p:txBody>
+      </p:sp>
+      <p:cxnSp>
+        <p:nvCxnSpPr>
+          <p:cNvPr id="35" name="Straight Connector 34"/>
+          <p:cNvCxnSpPr/>
+          <p:nvPr/>
+        </p:nvCxnSpPr>
+        <p:spPr>
+          <a:xfrm>
+            <a:off x="3289300" y="1415415"/>
+            <a:ext cx="3472815" cy="0"/>
+          </a:xfrm>
+          <a:prstGeom prst="line">
+            <a:avLst/>
+          </a:prstGeom>
+          <a:ln w="101600"/>
+        </p:spPr>
+        <p:style>
+          <a:lnRef idx="1">
+            <a:schemeClr val="accent1"/>
+          </a:lnRef>
+          <a:fillRef idx="0">
+            <a:schemeClr val="accent1"/>
+          </a:fillRef>
+          <a:effectRef idx="0">
+            <a:schemeClr val="accent1"/>
+          </a:effectRef>
+          <a:fontRef idx="minor">
+            <a:schemeClr val="tx1"/>
+          </a:fontRef>
+        </p:style>
+      </p:cxnSp>
+      <p:sp>
+        <p:nvSpPr>
+          <p:cNvPr id="36" name="Oval 35"/>
+          <p:cNvSpPr/>
+          <p:nvPr/>
+        </p:nvSpPr>
+        <p:spPr>
+          <a:xfrm>
+            <a:off x="3489960" y="2161540"/>
+            <a:ext cx="490855" cy="411480"/>
+          </a:xfrm>
+          <a:prstGeom prst="ellipse">
+            <a:avLst/>
+          </a:prstGeom>
+          <a:solidFill>
+            <a:schemeClr val="accent4"/>
+          </a:solidFill>
+        </p:spPr>
+        <p:style>
+          <a:lnRef idx="2">
+            <a:schemeClr val="accent1">
+              <a:shade val="50000"/>
+            </a:schemeClr>
+          </a:lnRef>
+          <a:fillRef idx="1">
+            <a:schemeClr val="accent1"/>
+          </a:fillRef>
+          <a:effectRef idx="0">
+            <a:schemeClr val="accent1"/>
+          </a:effectRef>
+          <a:fontRef idx="minor">
+            <a:schemeClr val="lt1"/>
+          </a:fontRef>
+        </p:style>
+        <p:txBody>
+          <a:bodyPr rtlCol="0" anchor="ctr">
+            <a:scene3d>
+              <a:camera prst="orthographicFront"/>
+              <a:lightRig rig="threePt" dir="t"/>
+            </a:scene3d>
+          </a:bodyPr>
+          <a:p>
+            <a:pPr algn="ctr"/>
+            <a:r>
+              <a:rPr lang="" altLang="en-US">
+                <a:ln/>
+                <a:gradFill>
+                  <a:gsLst>
+                    <a:gs pos="21000">
+                      <a:srgbClr val="53575C"/>
+                    </a:gs>
+                    <a:gs pos="88000">
+                      <a:srgbClr val="C5C7CA"/>
+                    </a:gs>
+                  </a:gsLst>
+                  <a:lin ang="5400000"/>
+                </a:gradFill>
+                <a:effectLst/>
+              </a:rPr>
+              <a:t>*</a:t>
+            </a:r>
+            <a:endParaRPr lang="" altLang="en-US">
+              <a:ln/>
+              <a:gradFill>
+                <a:gsLst>
+                  <a:gs pos="21000">
+                    <a:srgbClr val="53575C"/>
+                  </a:gs>
+                  <a:gs pos="88000">
+                    <a:srgbClr val="C5C7CA"/>
+                  </a:gs>
+                </a:gsLst>
+                <a:lin ang="5400000"/>
+              </a:gradFill>
+              <a:effectLst/>
+            </a:endParaRPr>
+          </a:p>
+        </p:txBody>
+      </p:sp>
+      <p:cxnSp>
+        <p:nvCxnSpPr>
+          <p:cNvPr id="37" name="Straight Connector 36"/>
+          <p:cNvCxnSpPr/>
+          <p:nvPr/>
+        </p:nvCxnSpPr>
+        <p:spPr>
+          <a:xfrm>
+            <a:off x="2671445" y="2374265"/>
+            <a:ext cx="0" cy="2331720"/>
+          </a:xfrm>
+          <a:prstGeom prst="line">
+            <a:avLst/>
+          </a:prstGeom>
+          <a:ln w="101600"/>
+        </p:spPr>
+        <p:style>
+          <a:lnRef idx="1">
+            <a:schemeClr val="accent1"/>
+          </a:lnRef>
+          <a:fillRef idx="0">
+            <a:schemeClr val="accent1"/>
+          </a:fillRef>
+          <a:effectRef idx="0">
+            <a:schemeClr val="accent1"/>
+          </a:effectRef>
+          <a:fontRef idx="minor">
+            <a:schemeClr val="tx1"/>
+          </a:fontRef>
+        </p:style>
+      </p:cxnSp>
+      <p:cxnSp>
+        <p:nvCxnSpPr>
+          <p:cNvPr id="38" name="Straight Connector 37"/>
+          <p:cNvCxnSpPr/>
+          <p:nvPr/>
+        </p:nvCxnSpPr>
+        <p:spPr>
+          <a:xfrm>
+            <a:off x="2703830" y="2367280"/>
+            <a:ext cx="798830" cy="0"/>
+          </a:xfrm>
+          <a:prstGeom prst="line">
+            <a:avLst/>
+          </a:prstGeom>
+          <a:ln w="101600"/>
+        </p:spPr>
+        <p:style>
+          <a:lnRef idx="1">
+            <a:schemeClr val="accent1"/>
+          </a:lnRef>
+          <a:fillRef idx="0">
+            <a:schemeClr val="accent1"/>
+          </a:fillRef>
+          <a:effectRef idx="0">
+            <a:schemeClr val="accent1"/>
+          </a:effectRef>
+          <a:fontRef idx="minor">
+            <a:schemeClr val="tx1"/>
+          </a:fontRef>
+        </p:style>
+      </p:cxnSp>
+      <p:sp>
+        <p:nvSpPr>
+          <p:cNvPr id="39" name="Oval 38"/>
+          <p:cNvSpPr/>
+          <p:nvPr/>
+        </p:nvSpPr>
+        <p:spPr>
+          <a:xfrm>
+            <a:off x="1404620" y="4473575"/>
+            <a:ext cx="511810" cy="464820"/>
+          </a:xfrm>
+          <a:prstGeom prst="ellipse">
+            <a:avLst/>
+          </a:prstGeom>
+          <a:solidFill>
+            <a:schemeClr val="accent2">
+              <a:lumMod val="60000"/>
+              <a:lumOff val="40000"/>
+            </a:schemeClr>
+          </a:solidFill>
+        </p:spPr>
+        <p:style>
+          <a:lnRef idx="2">
+            <a:schemeClr val="accent1">
+              <a:shade val="50000"/>
+            </a:schemeClr>
+          </a:lnRef>
+          <a:fillRef idx="1">
+            <a:schemeClr val="accent1"/>
+          </a:fillRef>
+          <a:effectRef idx="0">
+            <a:schemeClr val="accent1"/>
+          </a:effectRef>
+          <a:fontRef idx="minor">
+            <a:schemeClr val="lt1"/>
+          </a:fontRef>
+        </p:style>
+        <p:txBody>
+          <a:bodyPr rtlCol="0" anchor="ctr"/>
+          <a:p>
+            <a:pPr algn="ctr"/>
+            <a:r>
+              <a:rPr lang="" altLang="en-US"/>
+              <a:t>c</a:t>
+            </a:r>
+            <a:endParaRPr lang="" altLang="en-US"/>
+          </a:p>
+        </p:txBody>
+      </p:sp>
+      <p:sp>
+        <p:nvSpPr>
+          <p:cNvPr id="41" name="Oval 40"/>
+          <p:cNvSpPr/>
+          <p:nvPr/>
+        </p:nvSpPr>
+        <p:spPr>
+          <a:xfrm>
+            <a:off x="2495550" y="2225675"/>
+            <a:ext cx="511810" cy="464820"/>
+          </a:xfrm>
+          <a:prstGeom prst="ellipse">
+            <a:avLst/>
+          </a:prstGeom>
+          <a:solidFill>
+            <a:schemeClr val="accent2">
+              <a:lumMod val="60000"/>
+              <a:lumOff val="40000"/>
+            </a:schemeClr>
+          </a:solidFill>
+        </p:spPr>
+        <p:style>
+          <a:lnRef idx="2">
+            <a:schemeClr val="accent1">
+              <a:shade val="50000"/>
+            </a:schemeClr>
+          </a:lnRef>
+          <a:fillRef idx="1">
+            <a:schemeClr val="accent1"/>
+          </a:fillRef>
+          <a:effectRef idx="0">
+            <a:schemeClr val="accent1"/>
+          </a:effectRef>
+          <a:fontRef idx="minor">
+            <a:schemeClr val="lt1"/>
+          </a:fontRef>
+        </p:style>
+        <p:txBody>
+          <a:bodyPr rtlCol="0" anchor="ctr"/>
+          <a:p>
+            <a:pPr algn="ctr"/>
+            <a:r>
+              <a:rPr lang="en-US" altLang="en-US"/>
+              <a:t>c</a:t>
+            </a:r>
+            <a:endParaRPr lang="en-US" altLang="en-US"/>
+          </a:p>
+        </p:txBody>
+      </p:sp>
+      <p:cxnSp>
+        <p:nvCxnSpPr>
+          <p:cNvPr id="42" name="Straight Connector 41"/>
+          <p:cNvCxnSpPr/>
+          <p:nvPr/>
+        </p:nvCxnSpPr>
+        <p:spPr>
+          <a:xfrm>
+            <a:off x="3980815" y="2367280"/>
+            <a:ext cx="798830" cy="0"/>
+          </a:xfrm>
+          <a:prstGeom prst="line">
+            <a:avLst/>
+          </a:prstGeom>
+          <a:ln w="101600"/>
+        </p:spPr>
+        <p:style>
+          <a:lnRef idx="1">
+            <a:schemeClr val="accent1"/>
+          </a:lnRef>
+          <a:fillRef idx="0">
+            <a:schemeClr val="accent1"/>
+          </a:fillRef>
+          <a:effectRef idx="0">
+            <a:schemeClr val="accent1"/>
+          </a:effectRef>
+          <a:fontRef idx="minor">
+            <a:schemeClr val="tx1"/>
+          </a:fontRef>
+        </p:style>
+      </p:cxnSp>
+      <p:sp>
+        <p:nvSpPr>
+          <p:cNvPr id="43" name="Oval 42"/>
+          <p:cNvSpPr/>
+          <p:nvPr/>
+        </p:nvSpPr>
+        <p:spPr>
+          <a:xfrm>
+            <a:off x="4159885" y="2076450"/>
+            <a:ext cx="916940" cy="581660"/>
+          </a:xfrm>
+          <a:prstGeom prst="ellipse">
+            <a:avLst/>
+          </a:prstGeom>
+        </p:spPr>
+        <p:style>
+          <a:lnRef idx="2">
+            <a:schemeClr val="accent1">
+              <a:shade val="50000"/>
+            </a:schemeClr>
+          </a:lnRef>
+          <a:fillRef idx="1">
+            <a:schemeClr val="accent1"/>
+          </a:fillRef>
+          <a:effectRef idx="0">
+            <a:schemeClr val="accent1"/>
+          </a:effectRef>
+          <a:fontRef idx="minor">
+            <a:schemeClr val="lt1"/>
+          </a:fontRef>
+        </p:style>
+        <p:txBody>
+          <a:bodyPr rtlCol="0" anchor="ctr"/>
+          <a:p>
+            <a:pPr algn="ctr"/>
+            <a:r>
+              <a:rPr lang="en-US" altLang="en-US"/>
+              <a:t>w/b</a:t>
+            </a:r>
+            <a:endParaRPr lang="en-US" altLang="en-US"/>
+          </a:p>
+        </p:txBody>
+      </p:sp>
+      <p:cxnSp>
+        <p:nvCxnSpPr>
+          <p:cNvPr id="44" name="Straight Connector 43"/>
+          <p:cNvCxnSpPr/>
+          <p:nvPr/>
+        </p:nvCxnSpPr>
+        <p:spPr>
+          <a:xfrm flipV="1">
+            <a:off x="5034280" y="1990725"/>
+            <a:ext cx="480695" cy="383540"/>
+          </a:xfrm>
+          <a:prstGeom prst="line">
+            <a:avLst/>
+          </a:prstGeom>
+          <a:ln w="101600"/>
+        </p:spPr>
+        <p:style>
+          <a:lnRef idx="1">
+            <a:schemeClr val="accent1"/>
+          </a:lnRef>
+          <a:fillRef idx="0">
+            <a:schemeClr val="accent1"/>
+          </a:fillRef>
+          <a:effectRef idx="0">
+            <a:schemeClr val="accent1"/>
+          </a:effectRef>
+          <a:fontRef idx="minor">
+            <a:schemeClr val="tx1"/>
+          </a:fontRef>
+        </p:style>
+      </p:cxnSp>
+      <p:sp>
+        <p:nvSpPr>
+          <p:cNvPr id="45" name="Oval 44"/>
+          <p:cNvSpPr/>
+          <p:nvPr/>
+        </p:nvSpPr>
+        <p:spPr>
+          <a:xfrm>
+            <a:off x="5230495" y="2466340"/>
+            <a:ext cx="864870" cy="369570"/>
+          </a:xfrm>
+          <a:prstGeom prst="ellipse">
+            <a:avLst/>
+          </a:prstGeom>
+          <a:solidFill>
+            <a:schemeClr val="accent2">
+              <a:lumMod val="60000"/>
+              <a:lumOff val="40000"/>
+            </a:schemeClr>
+          </a:solidFill>
+        </p:spPr>
+        <p:style>
+          <a:lnRef idx="2">
+            <a:schemeClr val="accent1">
+              <a:shade val="50000"/>
+            </a:schemeClr>
+          </a:lnRef>
+          <a:fillRef idx="1">
+            <a:schemeClr val="accent1"/>
+          </a:fillRef>
+          <a:effectRef idx="0">
+            <a:schemeClr val="accent1"/>
+          </a:effectRef>
+          <a:fontRef idx="minor">
+            <a:schemeClr val="lt1"/>
+          </a:fontRef>
+        </p:style>
+        <p:txBody>
+          <a:bodyPr rtlCol="0" anchor="ctr"/>
+          <a:p>
+            <a:pPr algn="ctr"/>
+            <a:r>
+              <a:rPr lang="" altLang="en-US"/>
+              <a:t>-1</a:t>
+            </a:r>
+            <a:endParaRPr lang="" altLang="en-US"/>
+          </a:p>
+        </p:txBody>
+      </p:sp>
+      <p:cxnSp>
+        <p:nvCxnSpPr>
+          <p:cNvPr id="47" name="Straight Connector 46"/>
+          <p:cNvCxnSpPr/>
+          <p:nvPr/>
+        </p:nvCxnSpPr>
+        <p:spPr>
+          <a:xfrm>
+            <a:off x="5662930" y="2853055"/>
+            <a:ext cx="0" cy="447675"/>
+          </a:xfrm>
+          <a:prstGeom prst="line">
+            <a:avLst/>
+          </a:prstGeom>
+          <a:ln w="101600"/>
+        </p:spPr>
+        <p:style>
+          <a:lnRef idx="1">
+            <a:schemeClr val="accent1"/>
+          </a:lnRef>
+          <a:fillRef idx="0">
+            <a:schemeClr val="accent1"/>
+          </a:fillRef>
+          <a:effectRef idx="0">
+            <a:schemeClr val="accent1"/>
+          </a:effectRef>
+          <a:fontRef idx="minor">
+            <a:schemeClr val="tx1"/>
+          </a:fontRef>
+        </p:style>
+      </p:cxnSp>
+      <p:sp>
+        <p:nvSpPr>
+          <p:cNvPr id="48" name="Oval 47"/>
+          <p:cNvSpPr/>
+          <p:nvPr/>
+        </p:nvSpPr>
+        <p:spPr>
+          <a:xfrm>
+            <a:off x="5341620" y="1750060"/>
+            <a:ext cx="490855" cy="411480"/>
+          </a:xfrm>
+          <a:prstGeom prst="ellipse">
+            <a:avLst/>
+          </a:prstGeom>
+          <a:solidFill>
+            <a:schemeClr val="accent4"/>
+          </a:solidFill>
+        </p:spPr>
+        <p:style>
+          <a:lnRef idx="2">
+            <a:schemeClr val="accent1">
+              <a:shade val="50000"/>
+            </a:schemeClr>
+          </a:lnRef>
+          <a:fillRef idx="1">
+            <a:schemeClr val="accent1"/>
+          </a:fillRef>
+          <a:effectRef idx="0">
+            <a:schemeClr val="accent1"/>
+          </a:effectRef>
+          <a:fontRef idx="minor">
+            <a:schemeClr val="lt1"/>
+          </a:fontRef>
+        </p:style>
+        <p:txBody>
+          <a:bodyPr rtlCol="0" anchor="ctr"/>
+          <a:p>
+            <a:pPr algn="ctr"/>
+            <a:r>
+              <a:rPr lang="en-US" altLang="en-US"/>
+              <a:t>*</a:t>
+            </a:r>
+            <a:endParaRPr lang="en-US" altLang="en-US"/>
+          </a:p>
+        </p:txBody>
+      </p:sp>
+      <p:cxnSp>
+        <p:nvCxnSpPr>
+          <p:cNvPr id="49" name="Straight Connector 48"/>
+          <p:cNvCxnSpPr/>
+          <p:nvPr/>
+        </p:nvCxnSpPr>
+        <p:spPr>
+          <a:xfrm>
+            <a:off x="5662930" y="3114040"/>
+            <a:ext cx="1097915" cy="0"/>
+          </a:xfrm>
+          <a:prstGeom prst="line">
+            <a:avLst/>
+          </a:prstGeom>
+          <a:ln w="101600"/>
+        </p:spPr>
+        <p:style>
+          <a:lnRef idx="1">
+            <a:schemeClr val="accent1"/>
+          </a:lnRef>
+          <a:fillRef idx="0">
+            <a:schemeClr val="accent1"/>
+          </a:fillRef>
+          <a:effectRef idx="0">
+            <a:schemeClr val="accent1"/>
+          </a:effectRef>
+          <a:fontRef idx="minor">
+            <a:schemeClr val="tx1"/>
+          </a:fontRef>
+        </p:style>
+      </p:cxnSp>
+      <p:cxnSp>
+        <p:nvCxnSpPr>
+          <p:cNvPr id="50" name="Straight Connector 49"/>
+          <p:cNvCxnSpPr/>
+          <p:nvPr/>
+        </p:nvCxnSpPr>
+        <p:spPr>
+          <a:xfrm>
+            <a:off x="6762115" y="1415415"/>
+            <a:ext cx="0" cy="808355"/>
+          </a:xfrm>
+          <a:prstGeom prst="line">
+            <a:avLst/>
+          </a:prstGeom>
+          <a:ln w="101600"/>
+        </p:spPr>
+        <p:style>
+          <a:lnRef idx="1">
+            <a:schemeClr val="accent1"/>
+          </a:lnRef>
+          <a:fillRef idx="0">
+            <a:schemeClr val="accent1"/>
+          </a:fillRef>
+          <a:effectRef idx="0">
+            <a:schemeClr val="accent1"/>
+          </a:effectRef>
+          <a:fontRef idx="minor">
+            <a:schemeClr val="tx1"/>
+          </a:fontRef>
+        </p:style>
+      </p:cxnSp>
+      <p:sp>
+        <p:nvSpPr>
+          <p:cNvPr id="52" name="Oval 51"/>
+          <p:cNvSpPr/>
+          <p:nvPr/>
+        </p:nvSpPr>
+        <p:spPr>
+          <a:xfrm>
+            <a:off x="6516370" y="2262505"/>
+            <a:ext cx="490855" cy="411480"/>
+          </a:xfrm>
+          <a:prstGeom prst="ellipse">
+            <a:avLst/>
+          </a:prstGeom>
+          <a:solidFill>
+            <a:schemeClr val="accent4"/>
+          </a:solidFill>
+        </p:spPr>
+        <p:style>
+          <a:lnRef idx="2">
+            <a:schemeClr val="accent1">
+              <a:shade val="50000"/>
+            </a:schemeClr>
+          </a:lnRef>
+          <a:fillRef idx="1">
+            <a:schemeClr val="accent1"/>
+          </a:fillRef>
+          <a:effectRef idx="0">
+            <a:schemeClr val="accent1"/>
+          </a:effectRef>
+          <a:fontRef idx="minor">
+            <a:schemeClr val="lt1"/>
+          </a:fontRef>
+        </p:style>
+        <p:txBody>
+          <a:bodyPr rtlCol="0" anchor="ctr"/>
+          <a:p>
+            <a:pPr algn="ctr"/>
+            <a:r>
+              <a:rPr lang="en-US" altLang="en-US"/>
+              <a:t>*</a:t>
+            </a:r>
+            <a:endParaRPr lang="en-US" altLang="en-US"/>
+          </a:p>
+        </p:txBody>
+      </p:sp>
+      <p:cxnSp>
+        <p:nvCxnSpPr>
+          <p:cNvPr id="53" name="Straight Connector 52"/>
+          <p:cNvCxnSpPr/>
+          <p:nvPr/>
+        </p:nvCxnSpPr>
+        <p:spPr>
+          <a:xfrm>
+            <a:off x="6762115" y="2656205"/>
+            <a:ext cx="0" cy="463550"/>
+          </a:xfrm>
+          <a:prstGeom prst="line">
+            <a:avLst/>
+          </a:prstGeom>
+          <a:ln w="101600"/>
+        </p:spPr>
+        <p:style>
+          <a:lnRef idx="1">
+            <a:schemeClr val="accent1"/>
+          </a:lnRef>
+          <a:fillRef idx="0">
+            <a:schemeClr val="accent1"/>
+          </a:fillRef>
+          <a:effectRef idx="0">
+            <a:schemeClr val="accent1"/>
+          </a:effectRef>
+          <a:fontRef idx="minor">
+            <a:schemeClr val="tx1"/>
+          </a:fontRef>
+        </p:style>
+      </p:cxnSp>
+      <p:cxnSp>
+        <p:nvCxnSpPr>
+          <p:cNvPr id="54" name="Straight Connector 53"/>
+          <p:cNvCxnSpPr>
+            <a:endCxn id="56" idx="2"/>
+          </p:cNvCxnSpPr>
+          <p:nvPr/>
+        </p:nvCxnSpPr>
+        <p:spPr>
+          <a:xfrm>
+            <a:off x="5832475" y="1955800"/>
+            <a:ext cx="1939925" cy="304800"/>
+          </a:xfrm>
+          <a:prstGeom prst="line">
+            <a:avLst/>
+          </a:prstGeom>
+          <a:ln w="101600"/>
+        </p:spPr>
+        <p:style>
+          <a:lnRef idx="1">
+            <a:schemeClr val="accent1"/>
+          </a:lnRef>
+          <a:fillRef idx="0">
+            <a:schemeClr val="accent1"/>
+          </a:fillRef>
+          <a:effectRef idx="0">
+            <a:schemeClr val="accent1"/>
+          </a:effectRef>
+          <a:fontRef idx="minor">
+            <a:schemeClr val="tx1"/>
+          </a:fontRef>
+        </p:style>
+      </p:cxnSp>
+      <p:cxnSp>
+        <p:nvCxnSpPr>
+          <p:cNvPr id="55" name="Straight Connector 54"/>
+          <p:cNvCxnSpPr>
+            <a:endCxn id="56" idx="2"/>
+          </p:cNvCxnSpPr>
+          <p:nvPr/>
+        </p:nvCxnSpPr>
+        <p:spPr>
+          <a:xfrm flipV="1">
+            <a:off x="7007225" y="2260600"/>
+            <a:ext cx="765175" cy="205740"/>
+          </a:xfrm>
+          <a:prstGeom prst="line">
+            <a:avLst/>
+          </a:prstGeom>
+          <a:ln w="101600"/>
+        </p:spPr>
+        <p:style>
+          <a:lnRef idx="1">
+            <a:schemeClr val="accent1"/>
+          </a:lnRef>
+          <a:fillRef idx="0">
+            <a:schemeClr val="accent1"/>
+          </a:fillRef>
+          <a:effectRef idx="0">
+            <a:schemeClr val="accent1"/>
+          </a:effectRef>
+          <a:fontRef idx="minor">
+            <a:schemeClr val="tx1"/>
+          </a:fontRef>
+        </p:style>
+      </p:cxnSp>
+      <p:sp>
+        <p:nvSpPr>
+          <p:cNvPr id="56" name="Oval 55"/>
+          <p:cNvSpPr/>
+          <p:nvPr/>
+        </p:nvSpPr>
+        <p:spPr>
+          <a:xfrm>
+            <a:off x="7772400" y="2054860"/>
+            <a:ext cx="490855" cy="411480"/>
+          </a:xfrm>
+          <a:prstGeom prst="ellipse">
+            <a:avLst/>
+          </a:prstGeom>
+          <a:solidFill>
+            <a:schemeClr val="accent2">
+              <a:lumMod val="60000"/>
+              <a:lumOff val="40000"/>
+            </a:schemeClr>
+          </a:solidFill>
+        </p:spPr>
+        <p:style>
+          <a:lnRef idx="2">
+            <a:schemeClr val="accent1">
+              <a:shade val="50000"/>
+            </a:schemeClr>
+          </a:lnRef>
+          <a:fillRef idx="1">
+            <a:schemeClr val="accent1"/>
+          </a:fillRef>
+          <a:effectRef idx="0">
+            <a:schemeClr val="accent1"/>
+          </a:effectRef>
+          <a:fontRef idx="minor">
+            <a:schemeClr val="lt1"/>
+          </a:fontRef>
+        </p:style>
+        <p:txBody>
+          <a:bodyPr rtlCol="0" anchor="ctr"/>
+          <a:p>
+            <a:pPr algn="ctr"/>
+            <a:r>
+              <a:rPr lang="" altLang="en-US"/>
+              <a:t>＋</a:t>
+            </a:r>
+            <a:endParaRPr lang="" altLang="en-US"/>
+          </a:p>
+        </p:txBody>
+      </p:sp>
+      <p:cxnSp>
+        <p:nvCxnSpPr>
+          <p:cNvPr id="57" name="Straight Connector 56"/>
+          <p:cNvCxnSpPr/>
+          <p:nvPr/>
+        </p:nvCxnSpPr>
+        <p:spPr>
+          <a:xfrm>
+            <a:off x="8263255" y="2262505"/>
+            <a:ext cx="798830" cy="0"/>
+          </a:xfrm>
+          <a:prstGeom prst="line">
+            <a:avLst/>
+          </a:prstGeom>
+          <a:ln w="101600"/>
+        </p:spPr>
+        <p:style>
+          <a:lnRef idx="1">
+            <a:schemeClr val="accent1"/>
+          </a:lnRef>
+          <a:fillRef idx="0">
+            <a:schemeClr val="accent1"/>
+          </a:fillRef>
+          <a:effectRef idx="0">
+            <a:schemeClr val="accent1"/>
+          </a:effectRef>
+          <a:fontRef idx="minor">
+            <a:schemeClr val="tx1"/>
+          </a:fontRef>
+        </p:style>
+      </p:cxnSp>
+      <p:sp>
+        <p:nvSpPr>
+          <p:cNvPr id="58" name="Text Box 57"/>
+          <p:cNvSpPr txBox="1"/>
+          <p:nvPr/>
+        </p:nvSpPr>
+        <p:spPr>
+          <a:xfrm>
+            <a:off x="9062085" y="2054860"/>
+            <a:ext cx="883920" cy="368300"/>
+          </a:xfrm>
+          <a:prstGeom prst="rect">
+            <a:avLst/>
+          </a:prstGeom>
+          <a:noFill/>
+        </p:spPr>
+        <p:txBody>
+          <a:bodyPr wrap="square" rtlCol="0">
+            <a:spAutoFit/>
+          </a:bodyPr>
+          <a:p>
+            <a:r>
+              <a:rPr lang="en-US" altLang="en-US"/>
+              <a:t>h_t</a:t>
+            </a:r>
+            <a:endParaRPr lang="en-US" altLang="en-US"/>
+          </a:p>
+        </p:txBody>
+      </p:sp>
+    </p:spTree>
+  </p:cSld>
+  <p:clrMapOvr>
+    <a:masterClrMapping/>
+  </p:clrMapOvr>
+</p:sld>
+</file>
+
 <file path=ppt/theme/theme1.xml><?xml version="1.0" encoding="utf-8"?>
 <a:theme xmlns:a="http://schemas.openxmlformats.org/drawingml/2006/main" name="Office Theme">
   <a:themeElements>

</xml_diff>